<commit_message>
Update for the conference
</commit_message>
<xml_diff>
--- a/texasWirelessConf/pictures/overall.pptx
+++ b/texasWirelessConf/pictures/overall.pptx
@@ -289,7 +289,7 @@
             <a:fld id="{530820CF-B880-4189-942D-D702A7CBA730}" type="datetimeFigureOut">
               <a:rPr lang="zh-CN" altLang="en-US" smtClean="0"/>
               <a:pPr/>
-              <a:t>2/28/15</a:t>
+              <a:t>2015/4/16</a:t>
             </a:fld>
             <a:endParaRPr lang="zh-CN" altLang="en-US"/>
           </a:p>
@@ -456,7 +456,7 @@
             <a:fld id="{530820CF-B880-4189-942D-D702A7CBA730}" type="datetimeFigureOut">
               <a:rPr lang="zh-CN" altLang="en-US" smtClean="0"/>
               <a:pPr/>
-              <a:t>2/28/15</a:t>
+              <a:t>2015/4/16</a:t>
             </a:fld>
             <a:endParaRPr lang="zh-CN" altLang="en-US"/>
           </a:p>
@@ -633,7 +633,7 @@
             <a:fld id="{530820CF-B880-4189-942D-D702A7CBA730}" type="datetimeFigureOut">
               <a:rPr lang="zh-CN" altLang="en-US" smtClean="0"/>
               <a:pPr/>
-              <a:t>2/28/15</a:t>
+              <a:t>2015/4/16</a:t>
             </a:fld>
             <a:endParaRPr lang="zh-CN" altLang="en-US"/>
           </a:p>
@@ -800,7 +800,7 @@
             <a:fld id="{530820CF-B880-4189-942D-D702A7CBA730}" type="datetimeFigureOut">
               <a:rPr lang="zh-CN" altLang="en-US" smtClean="0"/>
               <a:pPr/>
-              <a:t>2/28/15</a:t>
+              <a:t>2015/4/16</a:t>
             </a:fld>
             <a:endParaRPr lang="zh-CN" altLang="en-US"/>
           </a:p>
@@ -1043,7 +1043,7 @@
             <a:fld id="{530820CF-B880-4189-942D-D702A7CBA730}" type="datetimeFigureOut">
               <a:rPr lang="zh-CN" altLang="en-US" smtClean="0"/>
               <a:pPr/>
-              <a:t>2/28/15</a:t>
+              <a:t>2015/4/16</a:t>
             </a:fld>
             <a:endParaRPr lang="zh-CN" altLang="en-US"/>
           </a:p>
@@ -1328,7 +1328,7 @@
             <a:fld id="{530820CF-B880-4189-942D-D702A7CBA730}" type="datetimeFigureOut">
               <a:rPr lang="zh-CN" altLang="en-US" smtClean="0"/>
               <a:pPr/>
-              <a:t>2/28/15</a:t>
+              <a:t>2015/4/16</a:t>
             </a:fld>
             <a:endParaRPr lang="zh-CN" altLang="en-US"/>
           </a:p>
@@ -1747,7 +1747,7 @@
             <a:fld id="{530820CF-B880-4189-942D-D702A7CBA730}" type="datetimeFigureOut">
               <a:rPr lang="zh-CN" altLang="en-US" smtClean="0"/>
               <a:pPr/>
-              <a:t>2/28/15</a:t>
+              <a:t>2015/4/16</a:t>
             </a:fld>
             <a:endParaRPr lang="zh-CN" altLang="en-US"/>
           </a:p>
@@ -1862,7 +1862,7 @@
             <a:fld id="{530820CF-B880-4189-942D-D702A7CBA730}" type="datetimeFigureOut">
               <a:rPr lang="zh-CN" altLang="en-US" smtClean="0"/>
               <a:pPr/>
-              <a:t>2/28/15</a:t>
+              <a:t>2015/4/16</a:t>
             </a:fld>
             <a:endParaRPr lang="zh-CN" altLang="en-US"/>
           </a:p>
@@ -1954,7 +1954,7 @@
             <a:fld id="{530820CF-B880-4189-942D-D702A7CBA730}" type="datetimeFigureOut">
               <a:rPr lang="zh-CN" altLang="en-US" smtClean="0"/>
               <a:pPr/>
-              <a:t>2/28/15</a:t>
+              <a:t>2015/4/16</a:t>
             </a:fld>
             <a:endParaRPr lang="zh-CN" altLang="en-US"/>
           </a:p>
@@ -2228,7 +2228,7 @@
             <a:fld id="{530820CF-B880-4189-942D-D702A7CBA730}" type="datetimeFigureOut">
               <a:rPr lang="zh-CN" altLang="en-US" smtClean="0"/>
               <a:pPr/>
-              <a:t>2/28/15</a:t>
+              <a:t>2015/4/16</a:t>
             </a:fld>
             <a:endParaRPr lang="zh-CN" altLang="en-US"/>
           </a:p>
@@ -2478,7 +2478,7 @@
             <a:fld id="{530820CF-B880-4189-942D-D702A7CBA730}" type="datetimeFigureOut">
               <a:rPr lang="zh-CN" altLang="en-US" smtClean="0"/>
               <a:pPr/>
-              <a:t>2/28/15</a:t>
+              <a:t>2015/4/16</a:t>
             </a:fld>
             <a:endParaRPr lang="zh-CN" altLang="en-US"/>
           </a:p>
@@ -2688,7 +2688,7 @@
             <a:fld id="{530820CF-B880-4189-942D-D702A7CBA730}" type="datetimeFigureOut">
               <a:rPr lang="zh-CN" altLang="en-US" smtClean="0"/>
               <a:pPr/>
-              <a:t>2/28/15</a:t>
+              <a:t>2015/4/16</a:t>
             </a:fld>
             <a:endParaRPr lang="zh-CN" altLang="en-US"/>
           </a:p>
@@ -3367,14 +3367,14 @@
             <a:noFill/>
           </a:ln>
           <a:extLst>
-            <a:ext uri="{909E8E84-426E-40dd-AFC4-6F175D3DCCD1}">
+            <a:ext uri="{909E8E84-426E-40DD-AFC4-6F175D3DCCD1}">
               <a14:hiddenFill xmlns:a14="http://schemas.microsoft.com/office/drawing/2010/main">
                 <a:solidFill>
                   <a:schemeClr val="accent1"/>
                 </a:solidFill>
               </a14:hiddenFill>
             </a:ext>
-            <a:ext uri="{91240B29-F687-4f45-9708-019B960494DF}">
+            <a:ext uri="{91240B29-F687-4F45-9708-019B960494DF}">
               <a14:hiddenLine xmlns:a14="http://schemas.microsoft.com/office/drawing/2010/main" w="9525">
                 <a:solidFill>
                   <a:schemeClr val="tx1"/>
@@ -3421,14 +3421,14 @@
             <a:noFill/>
           </a:ln>
           <a:extLst>
-            <a:ext uri="{909E8E84-426E-40dd-AFC4-6F175D3DCCD1}">
+            <a:ext uri="{909E8E84-426E-40DD-AFC4-6F175D3DCCD1}">
               <a14:hiddenFill xmlns:a14="http://schemas.microsoft.com/office/drawing/2010/main">
                 <a:solidFill>
                   <a:schemeClr val="accent1"/>
                 </a:solidFill>
               </a14:hiddenFill>
             </a:ext>
-            <a:ext uri="{91240B29-F687-4f45-9708-019B960494DF}">
+            <a:ext uri="{91240B29-F687-4F45-9708-019B960494DF}">
               <a14:hiddenLine xmlns:a14="http://schemas.microsoft.com/office/drawing/2010/main" w="9525">
                 <a:solidFill>
                   <a:schemeClr val="tx1"/>
@@ -3475,14 +3475,14 @@
             <a:noFill/>
           </a:ln>
           <a:extLst>
-            <a:ext uri="{909E8E84-426E-40dd-AFC4-6F175D3DCCD1}">
+            <a:ext uri="{909E8E84-426E-40DD-AFC4-6F175D3DCCD1}">
               <a14:hiddenFill xmlns:a14="http://schemas.microsoft.com/office/drawing/2010/main">
                 <a:solidFill>
                   <a:schemeClr val="accent1"/>
                 </a:solidFill>
               </a14:hiddenFill>
             </a:ext>
-            <a:ext uri="{91240B29-F687-4f45-9708-019B960494DF}">
+            <a:ext uri="{91240B29-F687-4F45-9708-019B960494DF}">
               <a14:hiddenLine xmlns:a14="http://schemas.microsoft.com/office/drawing/2010/main" w="9525">
                 <a:solidFill>
                   <a:schemeClr val="tx1"/>
@@ -3529,14 +3529,14 @@
             <a:noFill/>
           </a:ln>
           <a:extLst>
-            <a:ext uri="{909E8E84-426E-40dd-AFC4-6F175D3DCCD1}">
+            <a:ext uri="{909E8E84-426E-40DD-AFC4-6F175D3DCCD1}">
               <a14:hiddenFill xmlns:a14="http://schemas.microsoft.com/office/drawing/2010/main">
                 <a:solidFill>
                   <a:schemeClr val="accent1"/>
                 </a:solidFill>
               </a14:hiddenFill>
             </a:ext>
-            <a:ext uri="{91240B29-F687-4f45-9708-019B960494DF}">
+            <a:ext uri="{91240B29-F687-4F45-9708-019B960494DF}">
               <a14:hiddenLine xmlns:a14="http://schemas.microsoft.com/office/drawing/2010/main" w="9525">
                 <a:solidFill>
                   <a:schemeClr val="tx1"/>
@@ -3583,14 +3583,14 @@
             <a:noFill/>
           </a:ln>
           <a:extLst>
-            <a:ext uri="{909E8E84-426E-40dd-AFC4-6F175D3DCCD1}">
+            <a:ext uri="{909E8E84-426E-40DD-AFC4-6F175D3DCCD1}">
               <a14:hiddenFill xmlns:a14="http://schemas.microsoft.com/office/drawing/2010/main">
                 <a:solidFill>
                   <a:schemeClr val="accent1"/>
                 </a:solidFill>
               </a14:hiddenFill>
             </a:ext>
-            <a:ext uri="{91240B29-F687-4f45-9708-019B960494DF}">
+            <a:ext uri="{91240B29-F687-4F45-9708-019B960494DF}">
               <a14:hiddenLine xmlns:a14="http://schemas.microsoft.com/office/drawing/2010/main" w="9525">
                 <a:solidFill>
                   <a:schemeClr val="tx1"/>
@@ -3637,14 +3637,14 @@
             <a:noFill/>
           </a:ln>
           <a:extLst>
-            <a:ext uri="{909E8E84-426E-40dd-AFC4-6F175D3DCCD1}">
+            <a:ext uri="{909E8E84-426E-40DD-AFC4-6F175D3DCCD1}">
               <a14:hiddenFill xmlns:a14="http://schemas.microsoft.com/office/drawing/2010/main">
                 <a:solidFill>
                   <a:schemeClr val="accent1"/>
                 </a:solidFill>
               </a14:hiddenFill>
             </a:ext>
-            <a:ext uri="{91240B29-F687-4f45-9708-019B960494DF}">
+            <a:ext uri="{91240B29-F687-4F45-9708-019B960494DF}">
               <a14:hiddenLine xmlns:a14="http://schemas.microsoft.com/office/drawing/2010/main" w="9525">
                 <a:solidFill>
                   <a:schemeClr val="tx1"/>
@@ -3691,14 +3691,14 @@
             <a:noFill/>
           </a:ln>
           <a:extLst>
-            <a:ext uri="{909E8E84-426E-40dd-AFC4-6F175D3DCCD1}">
+            <a:ext uri="{909E8E84-426E-40DD-AFC4-6F175D3DCCD1}">
               <a14:hiddenFill xmlns:a14="http://schemas.microsoft.com/office/drawing/2010/main">
                 <a:solidFill>
                   <a:schemeClr val="accent1"/>
                 </a:solidFill>
               </a14:hiddenFill>
             </a:ext>
-            <a:ext uri="{91240B29-F687-4f45-9708-019B960494DF}">
+            <a:ext uri="{91240B29-F687-4F45-9708-019B960494DF}">
               <a14:hiddenLine xmlns:a14="http://schemas.microsoft.com/office/drawing/2010/main" w="9525">
                 <a:solidFill>
                   <a:schemeClr val="tx1"/>
@@ -3745,14 +3745,14 @@
             <a:noFill/>
           </a:ln>
           <a:extLst>
-            <a:ext uri="{909E8E84-426E-40dd-AFC4-6F175D3DCCD1}">
+            <a:ext uri="{909E8E84-426E-40DD-AFC4-6F175D3DCCD1}">
               <a14:hiddenFill xmlns:a14="http://schemas.microsoft.com/office/drawing/2010/main">
                 <a:solidFill>
                   <a:schemeClr val="accent1"/>
                 </a:solidFill>
               </a14:hiddenFill>
             </a:ext>
-            <a:ext uri="{91240B29-F687-4f45-9708-019B960494DF}">
+            <a:ext uri="{91240B29-F687-4F45-9708-019B960494DF}">
               <a14:hiddenLine xmlns:a14="http://schemas.microsoft.com/office/drawing/2010/main" w="9525">
                 <a:solidFill>
                   <a:schemeClr val="tx1"/>
@@ -3799,14 +3799,14 @@
             <a:noFill/>
           </a:ln>
           <a:extLst>
-            <a:ext uri="{909E8E84-426E-40dd-AFC4-6F175D3DCCD1}">
+            <a:ext uri="{909E8E84-426E-40DD-AFC4-6F175D3DCCD1}">
               <a14:hiddenFill xmlns:a14="http://schemas.microsoft.com/office/drawing/2010/main">
                 <a:solidFill>
                   <a:schemeClr val="accent1"/>
                 </a:solidFill>
               </a14:hiddenFill>
             </a:ext>
-            <a:ext uri="{91240B29-F687-4f45-9708-019B960494DF}">
+            <a:ext uri="{91240B29-F687-4F45-9708-019B960494DF}">
               <a14:hiddenLine xmlns:a14="http://schemas.microsoft.com/office/drawing/2010/main" w="9525">
                 <a:solidFill>
                   <a:schemeClr val="tx1"/>
@@ -3853,14 +3853,14 @@
             <a:noFill/>
           </a:ln>
           <a:extLst>
-            <a:ext uri="{909E8E84-426E-40dd-AFC4-6F175D3DCCD1}">
+            <a:ext uri="{909E8E84-426E-40DD-AFC4-6F175D3DCCD1}">
               <a14:hiddenFill xmlns:a14="http://schemas.microsoft.com/office/drawing/2010/main">
                 <a:solidFill>
                   <a:schemeClr val="accent1"/>
                 </a:solidFill>
               </a14:hiddenFill>
             </a:ext>
-            <a:ext uri="{91240B29-F687-4f45-9708-019B960494DF}">
+            <a:ext uri="{91240B29-F687-4F45-9708-019B960494DF}">
               <a14:hiddenLine xmlns:a14="http://schemas.microsoft.com/office/drawing/2010/main" w="9525">
                 <a:solidFill>
                   <a:schemeClr val="tx1"/>
@@ -3907,14 +3907,14 @@
             <a:noFill/>
           </a:ln>
           <a:extLst>
-            <a:ext uri="{909E8E84-426E-40dd-AFC4-6F175D3DCCD1}">
+            <a:ext uri="{909E8E84-426E-40DD-AFC4-6F175D3DCCD1}">
               <a14:hiddenFill xmlns:a14="http://schemas.microsoft.com/office/drawing/2010/main">
                 <a:solidFill>
                   <a:schemeClr val="accent1"/>
                 </a:solidFill>
               </a14:hiddenFill>
             </a:ext>
-            <a:ext uri="{91240B29-F687-4f45-9708-019B960494DF}">
+            <a:ext uri="{91240B29-F687-4F45-9708-019B960494DF}">
               <a14:hiddenLine xmlns:a14="http://schemas.microsoft.com/office/drawing/2010/main" w="9525">
                 <a:solidFill>
                   <a:schemeClr val="tx1"/>
@@ -8810,14 +8810,14 @@
             <a:noFill/>
           </a:ln>
           <a:extLst>
-            <a:ext uri="{909E8E84-426E-40dd-AFC4-6F175D3DCCD1}">
+            <a:ext uri="{909E8E84-426E-40DD-AFC4-6F175D3DCCD1}">
               <a14:hiddenFill xmlns:a14="http://schemas.microsoft.com/office/drawing/2010/main">
                 <a:solidFill>
                   <a:schemeClr val="accent1"/>
                 </a:solidFill>
               </a14:hiddenFill>
             </a:ext>
-            <a:ext uri="{91240B29-F687-4f45-9708-019B960494DF}">
+            <a:ext uri="{91240B29-F687-4F45-9708-019B960494DF}">
               <a14:hiddenLine xmlns:a14="http://schemas.microsoft.com/office/drawing/2010/main" w="9525">
                 <a:solidFill>
                   <a:schemeClr val="tx1"/>
@@ -9202,11 +9202,11 @@
           <p:nvPr/>
         </p:nvPicPr>
         <p:blipFill>
-          <a:blip r:embed="rId4" cstate="print">
+          <a:blip r:embed="rId6" cstate="print">
             <a:extLst>
               <a:ext uri="{BEBA8EAE-BF5A-486C-A8C5-ECC9F3942E4B}">
                 <a14:imgProps xmlns:a14="http://schemas.microsoft.com/office/drawing/2010/main">
-                  <a14:imgLayer r:embed="rId6">
+                  <a14:imgLayer r:embed="rId7">
                     <a14:imgEffect>
                       <a14:backgroundRemoval t="0" b="99123" l="0" r="100000">
                         <a14:foregroundMark x1="20000" y1="69591" x2="25185" y2="78947"/>
@@ -9253,14 +9253,14 @@
             <a:noFill/>
           </a:ln>
           <a:extLst>
-            <a:ext uri="{909E8E84-426E-40dd-AFC4-6F175D3DCCD1}">
+            <a:ext uri="{909E8E84-426E-40DD-AFC4-6F175D3DCCD1}">
               <a14:hiddenFill xmlns:a14="http://schemas.microsoft.com/office/drawing/2010/main">
                 <a:solidFill>
                   <a:schemeClr val="accent1"/>
                 </a:solidFill>
               </a14:hiddenFill>
             </a:ext>
-            <a:ext uri="{91240B29-F687-4f45-9708-019B960494DF}">
+            <a:ext uri="{91240B29-F687-4F45-9708-019B960494DF}">
               <a14:hiddenLine xmlns:a14="http://schemas.microsoft.com/office/drawing/2010/main" w="9525">
                 <a:solidFill>
                   <a:schemeClr val="tx1"/>
@@ -9282,11 +9282,11 @@
           <p:nvPr/>
         </p:nvPicPr>
         <p:blipFill>
-          <a:blip r:embed="rId4" cstate="print">
+          <a:blip r:embed="rId8" cstate="print">
             <a:extLst>
               <a:ext uri="{BEBA8EAE-BF5A-486C-A8C5-ECC9F3942E4B}">
                 <a14:imgProps xmlns:a14="http://schemas.microsoft.com/office/drawing/2010/main">
-                  <a14:imgLayer r:embed="rId7">
+                  <a14:imgLayer r:embed="rId9">
                     <a14:imgEffect>
                       <a14:backgroundRemoval t="0" b="99123" l="0" r="100000">
                         <a14:foregroundMark x1="20000" y1="69591" x2="25185" y2="78947"/>
@@ -9333,14 +9333,14 @@
             <a:noFill/>
           </a:ln>
           <a:extLst>
-            <a:ext uri="{909E8E84-426E-40dd-AFC4-6F175D3DCCD1}">
+            <a:ext uri="{909E8E84-426E-40DD-AFC4-6F175D3DCCD1}">
               <a14:hiddenFill xmlns:a14="http://schemas.microsoft.com/office/drawing/2010/main">
                 <a:solidFill>
                   <a:schemeClr val="accent1"/>
                 </a:solidFill>
               </a14:hiddenFill>
             </a:ext>
-            <a:ext uri="{91240B29-F687-4f45-9708-019B960494DF}">
+            <a:ext uri="{91240B29-F687-4F45-9708-019B960494DF}">
               <a14:hiddenLine xmlns:a14="http://schemas.microsoft.com/office/drawing/2010/main" w="9525">
                 <a:solidFill>
                   <a:schemeClr val="tx1"/>
@@ -9362,11 +9362,11 @@
           <p:nvPr/>
         </p:nvPicPr>
         <p:blipFill>
-          <a:blip r:embed="rId4" cstate="print">
+          <a:blip r:embed="rId10" cstate="print">
             <a:extLst>
               <a:ext uri="{BEBA8EAE-BF5A-486C-A8C5-ECC9F3942E4B}">
                 <a14:imgProps xmlns:a14="http://schemas.microsoft.com/office/drawing/2010/main">
-                  <a14:imgLayer r:embed="rId8">
+                  <a14:imgLayer r:embed="rId11">
                     <a14:imgEffect>
                       <a14:backgroundRemoval t="0" b="99123" l="0" r="100000">
                         <a14:foregroundMark x1="20000" y1="69591" x2="25185" y2="78947"/>
@@ -9413,14 +9413,14 @@
             <a:noFill/>
           </a:ln>
           <a:extLst>
-            <a:ext uri="{909E8E84-426E-40dd-AFC4-6F175D3DCCD1}">
+            <a:ext uri="{909E8E84-426E-40DD-AFC4-6F175D3DCCD1}">
               <a14:hiddenFill xmlns:a14="http://schemas.microsoft.com/office/drawing/2010/main">
                 <a:solidFill>
                   <a:schemeClr val="accent1"/>
                 </a:solidFill>
               </a14:hiddenFill>
             </a:ext>
-            <a:ext uri="{91240B29-F687-4f45-9708-019B960494DF}">
+            <a:ext uri="{91240B29-F687-4F45-9708-019B960494DF}">
               <a14:hiddenLine xmlns:a14="http://schemas.microsoft.com/office/drawing/2010/main" w="9525">
                 <a:solidFill>
                   <a:schemeClr val="tx1"/>
@@ -9442,11 +9442,11 @@
           <p:nvPr/>
         </p:nvPicPr>
         <p:blipFill>
-          <a:blip r:embed="rId4" cstate="print">
+          <a:blip r:embed="rId10" cstate="print">
             <a:extLst>
               <a:ext uri="{BEBA8EAE-BF5A-486C-A8C5-ECC9F3942E4B}">
                 <a14:imgProps xmlns:a14="http://schemas.microsoft.com/office/drawing/2010/main">
-                  <a14:imgLayer r:embed="rId9">
+                  <a14:imgLayer r:embed="rId11">
                     <a14:imgEffect>
                       <a14:backgroundRemoval t="0" b="99123" l="0" r="100000">
                         <a14:foregroundMark x1="20000" y1="69591" x2="25185" y2="78947"/>
@@ -9493,14 +9493,14 @@
             <a:noFill/>
           </a:ln>
           <a:extLst>
-            <a:ext uri="{909E8E84-426E-40dd-AFC4-6F175D3DCCD1}">
+            <a:ext uri="{909E8E84-426E-40DD-AFC4-6F175D3DCCD1}">
               <a14:hiddenFill xmlns:a14="http://schemas.microsoft.com/office/drawing/2010/main">
                 <a:solidFill>
                   <a:schemeClr val="accent1"/>
                 </a:solidFill>
               </a14:hiddenFill>
             </a:ext>
-            <a:ext uri="{91240B29-F687-4f45-9708-019B960494DF}">
+            <a:ext uri="{91240B29-F687-4F45-9708-019B960494DF}">
               <a14:hiddenLine xmlns:a14="http://schemas.microsoft.com/office/drawing/2010/main" w="9525">
                 <a:solidFill>
                   <a:schemeClr val="tx1"/>
@@ -9522,11 +9522,11 @@
           <p:nvPr/>
         </p:nvPicPr>
         <p:blipFill>
-          <a:blip r:embed="rId4" cstate="print">
+          <a:blip r:embed="rId6" cstate="print">
             <a:extLst>
               <a:ext uri="{BEBA8EAE-BF5A-486C-A8C5-ECC9F3942E4B}">
                 <a14:imgProps xmlns:a14="http://schemas.microsoft.com/office/drawing/2010/main">
-                  <a14:imgLayer r:embed="rId10">
+                  <a14:imgLayer r:embed="rId7">
                     <a14:imgEffect>
                       <a14:backgroundRemoval t="0" b="99123" l="0" r="100000">
                         <a14:foregroundMark x1="20000" y1="69591" x2="25185" y2="78947"/>
@@ -9573,14 +9573,14 @@
             <a:noFill/>
           </a:ln>
           <a:extLst>
-            <a:ext uri="{909E8E84-426E-40dd-AFC4-6F175D3DCCD1}">
+            <a:ext uri="{909E8E84-426E-40DD-AFC4-6F175D3DCCD1}">
               <a14:hiddenFill xmlns:a14="http://schemas.microsoft.com/office/drawing/2010/main">
                 <a:solidFill>
                   <a:schemeClr val="accent1"/>
                 </a:solidFill>
               </a14:hiddenFill>
             </a:ext>
-            <a:ext uri="{91240B29-F687-4f45-9708-019B960494DF}">
+            <a:ext uri="{91240B29-F687-4F45-9708-019B960494DF}">
               <a14:hiddenLine xmlns:a14="http://schemas.microsoft.com/office/drawing/2010/main" w="9525">
                 <a:solidFill>
                   <a:schemeClr val="tx1"/>
@@ -9602,11 +9602,11 @@
           <p:nvPr/>
         </p:nvPicPr>
         <p:blipFill>
-          <a:blip r:embed="rId4" cstate="print">
+          <a:blip r:embed="rId8" cstate="print">
             <a:extLst>
               <a:ext uri="{BEBA8EAE-BF5A-486C-A8C5-ECC9F3942E4B}">
                 <a14:imgProps xmlns:a14="http://schemas.microsoft.com/office/drawing/2010/main">
-                  <a14:imgLayer r:embed="rId8">
+                  <a14:imgLayer r:embed="rId9">
                     <a14:imgEffect>
                       <a14:backgroundRemoval t="0" b="99123" l="0" r="100000">
                         <a14:foregroundMark x1="20000" y1="69591" x2="25185" y2="78947"/>
@@ -9653,14 +9653,14 @@
             <a:noFill/>
           </a:ln>
           <a:extLst>
-            <a:ext uri="{909E8E84-426E-40dd-AFC4-6F175D3DCCD1}">
+            <a:ext uri="{909E8E84-426E-40DD-AFC4-6F175D3DCCD1}">
               <a14:hiddenFill xmlns:a14="http://schemas.microsoft.com/office/drawing/2010/main">
                 <a:solidFill>
                   <a:schemeClr val="accent1"/>
                 </a:solidFill>
               </a14:hiddenFill>
             </a:ext>
-            <a:ext uri="{91240B29-F687-4f45-9708-019B960494DF}">
+            <a:ext uri="{91240B29-F687-4F45-9708-019B960494DF}">
               <a14:hiddenLine xmlns:a14="http://schemas.microsoft.com/office/drawing/2010/main" w="9525">
                 <a:solidFill>
                   <a:schemeClr val="tx1"/>
@@ -9682,11 +9682,11 @@
           <p:nvPr/>
         </p:nvPicPr>
         <p:blipFill>
-          <a:blip r:embed="rId4" cstate="print">
+          <a:blip r:embed="rId6" cstate="print">
             <a:extLst>
               <a:ext uri="{BEBA8EAE-BF5A-486C-A8C5-ECC9F3942E4B}">
                 <a14:imgProps xmlns:a14="http://schemas.microsoft.com/office/drawing/2010/main">
-                  <a14:imgLayer r:embed="rId11">
+                  <a14:imgLayer r:embed="rId7">
                     <a14:imgEffect>
                       <a14:backgroundRemoval t="0" b="99123" l="0" r="100000">
                         <a14:foregroundMark x1="20000" y1="69591" x2="25185" y2="78947"/>
@@ -9733,14 +9733,14 @@
             <a:noFill/>
           </a:ln>
           <a:extLst>
-            <a:ext uri="{909E8E84-426E-40dd-AFC4-6F175D3DCCD1}">
+            <a:ext uri="{909E8E84-426E-40DD-AFC4-6F175D3DCCD1}">
               <a14:hiddenFill xmlns:a14="http://schemas.microsoft.com/office/drawing/2010/main">
                 <a:solidFill>
                   <a:schemeClr val="accent1"/>
                 </a:solidFill>
               </a14:hiddenFill>
             </a:ext>
-            <a:ext uri="{91240B29-F687-4f45-9708-019B960494DF}">
+            <a:ext uri="{91240B29-F687-4F45-9708-019B960494DF}">
               <a14:hiddenLine xmlns:a14="http://schemas.microsoft.com/office/drawing/2010/main" w="9525">
                 <a:solidFill>
                   <a:schemeClr val="tx1"/>
@@ -9762,7 +9762,7 @@
           <p:nvPr/>
         </p:nvPicPr>
         <p:blipFill>
-          <a:blip r:embed="rId4" cstate="print">
+          <a:blip r:embed="rId10" cstate="print">
             <a:extLst>
               <a:ext uri="{BEBA8EAE-BF5A-486C-A8C5-ECC9F3942E4B}">
                 <a14:imgProps xmlns:a14="http://schemas.microsoft.com/office/drawing/2010/main">
@@ -9813,14 +9813,14 @@
             <a:noFill/>
           </a:ln>
           <a:extLst>
-            <a:ext uri="{909E8E84-426E-40dd-AFC4-6F175D3DCCD1}">
+            <a:ext uri="{909E8E84-426E-40DD-AFC4-6F175D3DCCD1}">
               <a14:hiddenFill xmlns:a14="http://schemas.microsoft.com/office/drawing/2010/main">
                 <a:solidFill>
                   <a:schemeClr val="accent1"/>
                 </a:solidFill>
               </a14:hiddenFill>
             </a:ext>
-            <a:ext uri="{91240B29-F687-4f45-9708-019B960494DF}">
+            <a:ext uri="{91240B29-F687-4F45-9708-019B960494DF}">
               <a14:hiddenLine xmlns:a14="http://schemas.microsoft.com/office/drawing/2010/main" w="9525">
                 <a:solidFill>
                   <a:schemeClr val="tx1"/>
@@ -9846,7 +9846,7 @@
             <a:extLst>
               <a:ext uri="{BEBA8EAE-BF5A-486C-A8C5-ECC9F3942E4B}">
                 <a14:imgProps xmlns:a14="http://schemas.microsoft.com/office/drawing/2010/main">
-                  <a14:imgLayer r:embed="rId11">
+                  <a14:imgLayer r:embed="rId12">
                     <a14:imgEffect>
                       <a14:backgroundRemoval t="0" b="99123" l="0" r="100000">
                         <a14:foregroundMark x1="20000" y1="69591" x2="25185" y2="78947"/>
@@ -9893,14 +9893,14 @@
             <a:noFill/>
           </a:ln>
           <a:extLst>
-            <a:ext uri="{909E8E84-426E-40dd-AFC4-6F175D3DCCD1}">
+            <a:ext uri="{909E8E84-426E-40DD-AFC4-6F175D3DCCD1}">
               <a14:hiddenFill xmlns:a14="http://schemas.microsoft.com/office/drawing/2010/main">
                 <a:solidFill>
                   <a:schemeClr val="accent1"/>
                 </a:solidFill>
               </a14:hiddenFill>
             </a:ext>
-            <a:ext uri="{91240B29-F687-4f45-9708-019B960494DF}">
+            <a:ext uri="{91240B29-F687-4F45-9708-019B960494DF}">
               <a14:hiddenLine xmlns:a14="http://schemas.microsoft.com/office/drawing/2010/main" w="9525">
                 <a:solidFill>
                   <a:schemeClr val="tx1"/>
@@ -13174,11 +13174,18 @@
           <a:p>
             <a:pPr algn="ctr"/>
             <a:r>
+              <a:rPr lang="en-US" sz="4000" smtClean="0">
+                <a:latin typeface="Cambria Math"/>
+                <a:cs typeface="Cambria Math"/>
+              </a:rPr>
+              <a:t> </a:t>
+            </a:r>
+            <a:r>
               <a:rPr lang="en-US" sz="4000" dirty="0" smtClean="0">
                 <a:latin typeface="Cambria Math"/>
                 <a:cs typeface="Cambria Math"/>
               </a:rPr>
-              <a:t>3.) Dynamic path-planning </a:t>
+              <a:t>Dynamic path-planning </a:t>
             </a:r>
           </a:p>
         </p:txBody>
@@ -13191,7 +13198,7 @@
   <p:timing>
     <p:tnLst>
       <p:par>
-        <p:cTn xmlns:p14="http://schemas.microsoft.com/office/powerpoint/2010/main" id="1" dur="indefinite" restart="never" nodeType="tmRoot"/>
+        <p:cTn id="1" dur="indefinite" restart="never" nodeType="tmRoot"/>
       </p:par>
     </p:tnLst>
   </p:timing>

</xml_diff>

<commit_message>
Added the poster abstract
</commit_message>
<xml_diff>
--- a/texasWirelessConf/pictures/overall.pptx
+++ b/texasWirelessConf/pictures/overall.pptx
@@ -104,6 +104,22 @@
       </a:defRPr>
     </a:lvl9pPr>
   </p:defaultTextStyle>
+  <p:extLst>
+    <p:ext uri="{EFAFB233-063F-42B5-8137-9DF3F51BA10A}">
+      <p15:sldGuideLst xmlns:p15="http://schemas.microsoft.com/office/powerpoint/2012/main">
+        <p15:guide id="1" orient="horz" pos="2304">
+          <p15:clr>
+            <a:srgbClr val="A4A3A4"/>
+          </p15:clr>
+        </p15:guide>
+        <p15:guide id="2" pos="5040">
+          <p15:clr>
+            <a:srgbClr val="A4A3A4"/>
+          </p15:clr>
+        </p15:guide>
+      </p15:sldGuideLst>
+    </p:ext>
+  </p:extLst>
 </p:presentation>
 </file>
 
@@ -289,7 +305,7 @@
             <a:fld id="{530820CF-B880-4189-942D-D702A7CBA730}" type="datetimeFigureOut">
               <a:rPr lang="zh-CN" altLang="en-US" smtClean="0"/>
               <a:pPr/>
-              <a:t>2015/4/16</a:t>
+              <a:t>2015/8/11</a:t>
             </a:fld>
             <a:endParaRPr lang="zh-CN" altLang="en-US"/>
           </a:p>
@@ -456,7 +472,7 @@
             <a:fld id="{530820CF-B880-4189-942D-D702A7CBA730}" type="datetimeFigureOut">
               <a:rPr lang="zh-CN" altLang="en-US" smtClean="0"/>
               <a:pPr/>
-              <a:t>2015/4/16</a:t>
+              <a:t>2015/8/11</a:t>
             </a:fld>
             <a:endParaRPr lang="zh-CN" altLang="en-US"/>
           </a:p>
@@ -633,7 +649,7 @@
             <a:fld id="{530820CF-B880-4189-942D-D702A7CBA730}" type="datetimeFigureOut">
               <a:rPr lang="zh-CN" altLang="en-US" smtClean="0"/>
               <a:pPr/>
-              <a:t>2015/4/16</a:t>
+              <a:t>2015/8/11</a:t>
             </a:fld>
             <a:endParaRPr lang="zh-CN" altLang="en-US"/>
           </a:p>
@@ -800,7 +816,7 @@
             <a:fld id="{530820CF-B880-4189-942D-D702A7CBA730}" type="datetimeFigureOut">
               <a:rPr lang="zh-CN" altLang="en-US" smtClean="0"/>
               <a:pPr/>
-              <a:t>2015/4/16</a:t>
+              <a:t>2015/8/11</a:t>
             </a:fld>
             <a:endParaRPr lang="zh-CN" altLang="en-US"/>
           </a:p>
@@ -1043,7 +1059,7 @@
             <a:fld id="{530820CF-B880-4189-942D-D702A7CBA730}" type="datetimeFigureOut">
               <a:rPr lang="zh-CN" altLang="en-US" smtClean="0"/>
               <a:pPr/>
-              <a:t>2015/4/16</a:t>
+              <a:t>2015/8/11</a:t>
             </a:fld>
             <a:endParaRPr lang="zh-CN" altLang="en-US"/>
           </a:p>
@@ -1328,7 +1344,7 @@
             <a:fld id="{530820CF-B880-4189-942D-D702A7CBA730}" type="datetimeFigureOut">
               <a:rPr lang="zh-CN" altLang="en-US" smtClean="0"/>
               <a:pPr/>
-              <a:t>2015/4/16</a:t>
+              <a:t>2015/8/11</a:t>
             </a:fld>
             <a:endParaRPr lang="zh-CN" altLang="en-US"/>
           </a:p>
@@ -1747,7 +1763,7 @@
             <a:fld id="{530820CF-B880-4189-942D-D702A7CBA730}" type="datetimeFigureOut">
               <a:rPr lang="zh-CN" altLang="en-US" smtClean="0"/>
               <a:pPr/>
-              <a:t>2015/4/16</a:t>
+              <a:t>2015/8/11</a:t>
             </a:fld>
             <a:endParaRPr lang="zh-CN" altLang="en-US"/>
           </a:p>
@@ -1862,7 +1878,7 @@
             <a:fld id="{530820CF-B880-4189-942D-D702A7CBA730}" type="datetimeFigureOut">
               <a:rPr lang="zh-CN" altLang="en-US" smtClean="0"/>
               <a:pPr/>
-              <a:t>2015/4/16</a:t>
+              <a:t>2015/8/11</a:t>
             </a:fld>
             <a:endParaRPr lang="zh-CN" altLang="en-US"/>
           </a:p>
@@ -1954,7 +1970,7 @@
             <a:fld id="{530820CF-B880-4189-942D-D702A7CBA730}" type="datetimeFigureOut">
               <a:rPr lang="zh-CN" altLang="en-US" smtClean="0"/>
               <a:pPr/>
-              <a:t>2015/4/16</a:t>
+              <a:t>2015/8/11</a:t>
             </a:fld>
             <a:endParaRPr lang="zh-CN" altLang="en-US"/>
           </a:p>
@@ -2228,7 +2244,7 @@
             <a:fld id="{530820CF-B880-4189-942D-D702A7CBA730}" type="datetimeFigureOut">
               <a:rPr lang="zh-CN" altLang="en-US" smtClean="0"/>
               <a:pPr/>
-              <a:t>2015/4/16</a:t>
+              <a:t>2015/8/11</a:t>
             </a:fld>
             <a:endParaRPr lang="zh-CN" altLang="en-US"/>
           </a:p>
@@ -2478,7 +2494,7 @@
             <a:fld id="{530820CF-B880-4189-942D-D702A7CBA730}" type="datetimeFigureOut">
               <a:rPr lang="zh-CN" altLang="en-US" smtClean="0"/>
               <a:pPr/>
-              <a:t>2015/4/16</a:t>
+              <a:t>2015/8/11</a:t>
             </a:fld>
             <a:endParaRPr lang="zh-CN" altLang="en-US"/>
           </a:p>
@@ -2688,7 +2704,7 @@
             <a:fld id="{530820CF-B880-4189-942D-D702A7CBA730}" type="datetimeFigureOut">
               <a:rPr lang="zh-CN" altLang="en-US" smtClean="0"/>
               <a:pPr/>
-              <a:t>2015/4/16</a:t>
+              <a:t>2015/8/11</a:t>
             </a:fld>
             <a:endParaRPr lang="zh-CN" altLang="en-US"/>
           </a:p>
@@ -4568,6 +4584,11 @@
             <a:prstGeom prst="rect">
               <a:avLst/>
             </a:prstGeom>
+            <a:ln>
+              <a:solidFill>
+                <a:srgbClr val="00FF00"/>
+              </a:solidFill>
+            </a:ln>
           </p:spPr>
           <p:style>
             <a:lnRef idx="2">
@@ -4610,6 +4631,11 @@
                 <a:gd name="adj" fmla="val 20621"/>
               </a:avLst>
             </a:prstGeom>
+            <a:ln>
+              <a:solidFill>
+                <a:srgbClr val="00FF00"/>
+              </a:solidFill>
+            </a:ln>
           </p:spPr>
           <p:style>
             <a:lnRef idx="2">
@@ -4654,7 +4680,9 @@
               <a:schemeClr val="bg1"/>
             </a:solidFill>
             <a:ln>
-              <a:noFill/>
+              <a:solidFill>
+                <a:srgbClr val="00FF00"/>
+              </a:solidFill>
             </a:ln>
           </p:spPr>
           <p:style>
@@ -4700,7 +4728,9 @@
               <a:schemeClr val="tx1"/>
             </a:solidFill>
             <a:ln>
-              <a:noFill/>
+              <a:solidFill>
+                <a:srgbClr val="00FF00"/>
+              </a:solidFill>
             </a:ln>
           </p:spPr>
           <p:style>
@@ -4744,7 +4774,9 @@
               <a:schemeClr val="tx1"/>
             </a:solidFill>
             <a:ln>
-              <a:noFill/>
+              <a:solidFill>
+                <a:srgbClr val="00FF00"/>
+              </a:solidFill>
             </a:ln>
           </p:spPr>
           <p:style>
@@ -4788,7 +4820,9 @@
               <a:schemeClr val="tx1"/>
             </a:solidFill>
             <a:ln>
-              <a:noFill/>
+              <a:solidFill>
+                <a:srgbClr val="00FF00"/>
+              </a:solidFill>
             </a:ln>
           </p:spPr>
           <p:style>
@@ -4832,7 +4866,9 @@
               <a:schemeClr val="tx1"/>
             </a:solidFill>
             <a:ln>
-              <a:noFill/>
+              <a:solidFill>
+                <a:srgbClr val="00FF00"/>
+              </a:solidFill>
             </a:ln>
           </p:spPr>
           <p:style>
@@ -4887,6 +4923,11 @@
             <a:prstGeom prst="rect">
               <a:avLst/>
             </a:prstGeom>
+            <a:ln>
+              <a:solidFill>
+                <a:srgbClr val="FFC000"/>
+              </a:solidFill>
+            </a:ln>
           </p:spPr>
           <p:style>
             <a:lnRef idx="2">
@@ -4929,6 +4970,11 @@
                 <a:gd name="adj" fmla="val 20621"/>
               </a:avLst>
             </a:prstGeom>
+            <a:ln>
+              <a:solidFill>
+                <a:srgbClr val="FFC000"/>
+              </a:solidFill>
+            </a:ln>
           </p:spPr>
           <p:style>
             <a:lnRef idx="2">
@@ -4973,7 +5019,9 @@
               <a:schemeClr val="bg1"/>
             </a:solidFill>
             <a:ln>
-              <a:noFill/>
+              <a:solidFill>
+                <a:srgbClr val="FFC000"/>
+              </a:solidFill>
             </a:ln>
           </p:spPr>
           <p:style>
@@ -5019,7 +5067,9 @@
               <a:schemeClr val="tx1"/>
             </a:solidFill>
             <a:ln>
-              <a:noFill/>
+              <a:solidFill>
+                <a:srgbClr val="FFC000"/>
+              </a:solidFill>
             </a:ln>
           </p:spPr>
           <p:style>
@@ -5063,7 +5113,9 @@
               <a:schemeClr val="tx1"/>
             </a:solidFill>
             <a:ln>
-              <a:noFill/>
+              <a:solidFill>
+                <a:srgbClr val="FFC000"/>
+              </a:solidFill>
             </a:ln>
           </p:spPr>
           <p:style>
@@ -5107,7 +5159,9 @@
               <a:schemeClr val="tx1"/>
             </a:solidFill>
             <a:ln>
-              <a:noFill/>
+              <a:solidFill>
+                <a:srgbClr val="FFC000"/>
+              </a:solidFill>
             </a:ln>
           </p:spPr>
           <p:style>
@@ -5162,6 +5216,11 @@
             <a:prstGeom prst="rect">
               <a:avLst/>
             </a:prstGeom>
+            <a:ln>
+              <a:solidFill>
+                <a:srgbClr val="FFC000"/>
+              </a:solidFill>
+            </a:ln>
           </p:spPr>
           <p:style>
             <a:lnRef idx="2">
@@ -5204,6 +5263,11 @@
                 <a:gd name="adj" fmla="val 20621"/>
               </a:avLst>
             </a:prstGeom>
+            <a:ln>
+              <a:solidFill>
+                <a:srgbClr val="FFC000"/>
+              </a:solidFill>
+            </a:ln>
           </p:spPr>
           <p:style>
             <a:lnRef idx="2">
@@ -5248,7 +5312,9 @@
               <a:schemeClr val="bg1"/>
             </a:solidFill>
             <a:ln>
-              <a:noFill/>
+              <a:solidFill>
+                <a:srgbClr val="FFC000"/>
+              </a:solidFill>
             </a:ln>
           </p:spPr>
           <p:style>
@@ -5294,7 +5360,9 @@
               <a:schemeClr val="tx1"/>
             </a:solidFill>
             <a:ln>
-              <a:noFill/>
+              <a:solidFill>
+                <a:srgbClr val="FFC000"/>
+              </a:solidFill>
             </a:ln>
           </p:spPr>
           <p:style>
@@ -5338,7 +5406,9 @@
               <a:schemeClr val="tx1"/>
             </a:solidFill>
             <a:ln>
-              <a:noFill/>
+              <a:solidFill>
+                <a:srgbClr val="FFC000"/>
+              </a:solidFill>
             </a:ln>
           </p:spPr>
           <p:style>
@@ -5382,7 +5452,9 @@
               <a:schemeClr val="tx1"/>
             </a:solidFill>
             <a:ln>
-              <a:noFill/>
+              <a:solidFill>
+                <a:srgbClr val="FFC000"/>
+              </a:solidFill>
             </a:ln>
           </p:spPr>
           <p:style>
@@ -5437,6 +5509,11 @@
             <a:prstGeom prst="rect">
               <a:avLst/>
             </a:prstGeom>
+            <a:ln>
+              <a:solidFill>
+                <a:srgbClr val="FF0000"/>
+              </a:solidFill>
+            </a:ln>
           </p:spPr>
           <p:style>
             <a:lnRef idx="2">
@@ -5479,6 +5556,11 @@
                 <a:gd name="adj" fmla="val 20621"/>
               </a:avLst>
             </a:prstGeom>
+            <a:ln>
+              <a:solidFill>
+                <a:srgbClr val="FF0000"/>
+              </a:solidFill>
+            </a:ln>
           </p:spPr>
           <p:style>
             <a:lnRef idx="2">
@@ -5523,7 +5605,9 @@
               <a:schemeClr val="bg1"/>
             </a:solidFill>
             <a:ln>
-              <a:noFill/>
+              <a:solidFill>
+                <a:srgbClr val="FF0000"/>
+              </a:solidFill>
             </a:ln>
           </p:spPr>
           <p:style>
@@ -5569,7 +5653,9 @@
               <a:schemeClr val="tx1"/>
             </a:solidFill>
             <a:ln>
-              <a:noFill/>
+              <a:solidFill>
+                <a:srgbClr val="FF0000"/>
+              </a:solidFill>
             </a:ln>
           </p:spPr>
           <p:style>
@@ -5624,6 +5710,11 @@
             <a:prstGeom prst="rect">
               <a:avLst/>
             </a:prstGeom>
+            <a:ln>
+              <a:solidFill>
+                <a:srgbClr val="00FF00"/>
+              </a:solidFill>
+            </a:ln>
           </p:spPr>
           <p:style>
             <a:lnRef idx="2">
@@ -5666,6 +5757,11 @@
                 <a:gd name="adj" fmla="val 20621"/>
               </a:avLst>
             </a:prstGeom>
+            <a:ln>
+              <a:solidFill>
+                <a:srgbClr val="00FF00"/>
+              </a:solidFill>
+            </a:ln>
           </p:spPr>
           <p:style>
             <a:lnRef idx="2">
@@ -5710,7 +5806,9 @@
               <a:schemeClr val="bg1"/>
             </a:solidFill>
             <a:ln>
-              <a:noFill/>
+              <a:solidFill>
+                <a:srgbClr val="00FF00"/>
+              </a:solidFill>
             </a:ln>
           </p:spPr>
           <p:style>
@@ -5756,7 +5854,9 @@
               <a:schemeClr val="tx1"/>
             </a:solidFill>
             <a:ln>
-              <a:noFill/>
+              <a:solidFill>
+                <a:srgbClr val="00FF00"/>
+              </a:solidFill>
             </a:ln>
           </p:spPr>
           <p:style>
@@ -5800,7 +5900,9 @@
               <a:schemeClr val="tx1"/>
             </a:solidFill>
             <a:ln>
-              <a:noFill/>
+              <a:solidFill>
+                <a:srgbClr val="00FF00"/>
+              </a:solidFill>
             </a:ln>
           </p:spPr>
           <p:style>
@@ -5844,7 +5946,9 @@
               <a:schemeClr val="tx1"/>
             </a:solidFill>
             <a:ln>
-              <a:noFill/>
+              <a:solidFill>
+                <a:srgbClr val="00FF00"/>
+              </a:solidFill>
             </a:ln>
           </p:spPr>
           <p:style>
@@ -5888,7 +5992,9 @@
               <a:schemeClr val="tx1"/>
             </a:solidFill>
             <a:ln>
-              <a:noFill/>
+              <a:solidFill>
+                <a:srgbClr val="00FF00"/>
+              </a:solidFill>
             </a:ln>
           </p:spPr>
           <p:style>
@@ -5943,6 +6049,11 @@
             <a:prstGeom prst="rect">
               <a:avLst/>
             </a:prstGeom>
+            <a:ln>
+              <a:solidFill>
+                <a:srgbClr val="00FF00"/>
+              </a:solidFill>
+            </a:ln>
           </p:spPr>
           <p:style>
             <a:lnRef idx="2">
@@ -5985,6 +6096,11 @@
                 <a:gd name="adj" fmla="val 20621"/>
               </a:avLst>
             </a:prstGeom>
+            <a:ln>
+              <a:solidFill>
+                <a:srgbClr val="00FF00"/>
+              </a:solidFill>
+            </a:ln>
           </p:spPr>
           <p:style>
             <a:lnRef idx="2">
@@ -6029,7 +6145,9 @@
               <a:schemeClr val="bg1"/>
             </a:solidFill>
             <a:ln>
-              <a:noFill/>
+              <a:solidFill>
+                <a:srgbClr val="00FF00"/>
+              </a:solidFill>
             </a:ln>
           </p:spPr>
           <p:style>
@@ -6075,7 +6193,9 @@
               <a:schemeClr val="tx1"/>
             </a:solidFill>
             <a:ln>
-              <a:noFill/>
+              <a:solidFill>
+                <a:srgbClr val="00FF00"/>
+              </a:solidFill>
             </a:ln>
           </p:spPr>
           <p:style>
@@ -6119,7 +6239,9 @@
               <a:schemeClr val="tx1"/>
             </a:solidFill>
             <a:ln>
-              <a:noFill/>
+              <a:solidFill>
+                <a:srgbClr val="00FF00"/>
+              </a:solidFill>
             </a:ln>
           </p:spPr>
           <p:style>
@@ -6163,7 +6285,9 @@
               <a:schemeClr val="tx1"/>
             </a:solidFill>
             <a:ln>
-              <a:noFill/>
+              <a:solidFill>
+                <a:srgbClr val="00FF00"/>
+              </a:solidFill>
             </a:ln>
           </p:spPr>
           <p:style>
@@ -6207,7 +6331,9 @@
               <a:schemeClr val="tx1"/>
             </a:solidFill>
             <a:ln>
-              <a:noFill/>
+              <a:solidFill>
+                <a:srgbClr val="00FF00"/>
+              </a:solidFill>
             </a:ln>
           </p:spPr>
           <p:style>
@@ -6262,6 +6388,11 @@
             <a:prstGeom prst="rect">
               <a:avLst/>
             </a:prstGeom>
+            <a:ln>
+              <a:solidFill>
+                <a:srgbClr val="00FF00"/>
+              </a:solidFill>
+            </a:ln>
           </p:spPr>
           <p:style>
             <a:lnRef idx="2">
@@ -6304,6 +6435,11 @@
                 <a:gd name="adj" fmla="val 20621"/>
               </a:avLst>
             </a:prstGeom>
+            <a:ln>
+              <a:solidFill>
+                <a:srgbClr val="00FF00"/>
+              </a:solidFill>
+            </a:ln>
           </p:spPr>
           <p:style>
             <a:lnRef idx="2">
@@ -6348,7 +6484,9 @@
               <a:schemeClr val="bg1"/>
             </a:solidFill>
             <a:ln>
-              <a:noFill/>
+              <a:solidFill>
+                <a:srgbClr val="00FF00"/>
+              </a:solidFill>
             </a:ln>
           </p:spPr>
           <p:style>
@@ -6394,7 +6532,9 @@
               <a:schemeClr val="tx1"/>
             </a:solidFill>
             <a:ln>
-              <a:noFill/>
+              <a:solidFill>
+                <a:srgbClr val="00FF00"/>
+              </a:solidFill>
             </a:ln>
           </p:spPr>
           <p:style>
@@ -6438,7 +6578,9 @@
               <a:schemeClr val="tx1"/>
             </a:solidFill>
             <a:ln>
-              <a:noFill/>
+              <a:solidFill>
+                <a:srgbClr val="00FF00"/>
+              </a:solidFill>
             </a:ln>
           </p:spPr>
           <p:style>
@@ -6482,7 +6624,9 @@
               <a:schemeClr val="tx1"/>
             </a:solidFill>
             <a:ln>
-              <a:noFill/>
+              <a:solidFill>
+                <a:srgbClr val="00FF00"/>
+              </a:solidFill>
             </a:ln>
           </p:spPr>
           <p:style>
@@ -6526,7 +6670,9 @@
               <a:schemeClr val="tx1"/>
             </a:solidFill>
             <a:ln>
-              <a:noFill/>
+              <a:solidFill>
+                <a:srgbClr val="00FF00"/>
+              </a:solidFill>
             </a:ln>
           </p:spPr>
           <p:style>
@@ -6581,6 +6727,11 @@
             <a:prstGeom prst="rect">
               <a:avLst/>
             </a:prstGeom>
+            <a:ln>
+              <a:solidFill>
+                <a:srgbClr val="FF0000"/>
+              </a:solidFill>
+            </a:ln>
           </p:spPr>
           <p:style>
             <a:lnRef idx="2">
@@ -6623,6 +6774,11 @@
                 <a:gd name="adj" fmla="val 20621"/>
               </a:avLst>
             </a:prstGeom>
+            <a:ln>
+              <a:solidFill>
+                <a:srgbClr val="FF0000"/>
+              </a:solidFill>
+            </a:ln>
           </p:spPr>
           <p:style>
             <a:lnRef idx="2">
@@ -6667,7 +6823,9 @@
               <a:schemeClr val="bg1"/>
             </a:solidFill>
             <a:ln>
-              <a:noFill/>
+              <a:solidFill>
+                <a:srgbClr val="FF0000"/>
+              </a:solidFill>
             </a:ln>
           </p:spPr>
           <p:style>
@@ -6724,6 +6882,11 @@
             <a:prstGeom prst="rect">
               <a:avLst/>
             </a:prstGeom>
+            <a:ln>
+              <a:solidFill>
+                <a:srgbClr val="00FF00"/>
+              </a:solidFill>
+            </a:ln>
           </p:spPr>
           <p:style>
             <a:lnRef idx="2">
@@ -6766,6 +6929,11 @@
                 <a:gd name="adj" fmla="val 20621"/>
               </a:avLst>
             </a:prstGeom>
+            <a:ln>
+              <a:solidFill>
+                <a:srgbClr val="00FF00"/>
+              </a:solidFill>
+            </a:ln>
           </p:spPr>
           <p:style>
             <a:lnRef idx="2">
@@ -6810,7 +6978,9 @@
               <a:schemeClr val="bg1"/>
             </a:solidFill>
             <a:ln>
-              <a:noFill/>
+              <a:solidFill>
+                <a:srgbClr val="00FF00"/>
+              </a:solidFill>
             </a:ln>
           </p:spPr>
           <p:style>
@@ -6856,7 +7026,9 @@
               <a:schemeClr val="tx1"/>
             </a:solidFill>
             <a:ln>
-              <a:noFill/>
+              <a:solidFill>
+                <a:srgbClr val="00FF00"/>
+              </a:solidFill>
             </a:ln>
           </p:spPr>
           <p:style>
@@ -6900,7 +7072,9 @@
               <a:schemeClr val="tx1"/>
             </a:solidFill>
             <a:ln>
-              <a:noFill/>
+              <a:solidFill>
+                <a:srgbClr val="00FF00"/>
+              </a:solidFill>
             </a:ln>
           </p:spPr>
           <p:style>
@@ -6944,7 +7118,9 @@
               <a:schemeClr val="tx1"/>
             </a:solidFill>
             <a:ln>
-              <a:noFill/>
+              <a:solidFill>
+                <a:srgbClr val="00FF00"/>
+              </a:solidFill>
             </a:ln>
           </p:spPr>
           <p:style>
@@ -6988,7 +7164,9 @@
               <a:schemeClr val="tx1"/>
             </a:solidFill>
             <a:ln>
-              <a:noFill/>
+              <a:solidFill>
+                <a:srgbClr val="00FF00"/>
+              </a:solidFill>
             </a:ln>
           </p:spPr>
           <p:style>
@@ -7043,6 +7221,11 @@
             <a:prstGeom prst="rect">
               <a:avLst/>
             </a:prstGeom>
+            <a:ln>
+              <a:solidFill>
+                <a:srgbClr val="FFC000"/>
+              </a:solidFill>
+            </a:ln>
           </p:spPr>
           <p:style>
             <a:lnRef idx="2">
@@ -7085,6 +7268,11 @@
                 <a:gd name="adj" fmla="val 20621"/>
               </a:avLst>
             </a:prstGeom>
+            <a:ln>
+              <a:solidFill>
+                <a:srgbClr val="FFC000"/>
+              </a:solidFill>
+            </a:ln>
           </p:spPr>
           <p:style>
             <a:lnRef idx="2">
@@ -7129,7 +7317,9 @@
               <a:schemeClr val="bg1"/>
             </a:solidFill>
             <a:ln>
-              <a:noFill/>
+              <a:solidFill>
+                <a:srgbClr val="FFC000"/>
+              </a:solidFill>
             </a:ln>
           </p:spPr>
           <p:style>
@@ -7175,7 +7365,9 @@
               <a:schemeClr val="tx1"/>
             </a:solidFill>
             <a:ln>
-              <a:noFill/>
+              <a:solidFill>
+                <a:srgbClr val="FFC000"/>
+              </a:solidFill>
             </a:ln>
           </p:spPr>
           <p:style>
@@ -7219,7 +7411,9 @@
               <a:schemeClr val="tx1"/>
             </a:solidFill>
             <a:ln>
-              <a:noFill/>
+              <a:solidFill>
+                <a:srgbClr val="FFC000"/>
+              </a:solidFill>
             </a:ln>
           </p:spPr>
           <p:style>
@@ -7263,7 +7457,9 @@
               <a:schemeClr val="tx1"/>
             </a:solidFill>
             <a:ln>
-              <a:noFill/>
+              <a:solidFill>
+                <a:srgbClr val="FFC000"/>
+              </a:solidFill>
             </a:ln>
           </p:spPr>
           <p:style>
@@ -7318,6 +7514,11 @@
             <a:prstGeom prst="rect">
               <a:avLst/>
             </a:prstGeom>
+            <a:ln>
+              <a:solidFill>
+                <a:srgbClr val="FF0000"/>
+              </a:solidFill>
+            </a:ln>
           </p:spPr>
           <p:style>
             <a:lnRef idx="2">
@@ -7360,6 +7561,11 @@
                 <a:gd name="adj" fmla="val 20621"/>
               </a:avLst>
             </a:prstGeom>
+            <a:ln>
+              <a:solidFill>
+                <a:srgbClr val="FF0000"/>
+              </a:solidFill>
+            </a:ln>
           </p:spPr>
           <p:style>
             <a:lnRef idx="2">
@@ -7404,7 +7610,9 @@
               <a:schemeClr val="bg1"/>
             </a:solidFill>
             <a:ln>
-              <a:noFill/>
+              <a:solidFill>
+                <a:srgbClr val="FF0000"/>
+              </a:solidFill>
             </a:ln>
           </p:spPr>
           <p:style>
@@ -7450,7 +7658,9 @@
               <a:schemeClr val="tx1"/>
             </a:solidFill>
             <a:ln>
-              <a:noFill/>
+              <a:solidFill>
+                <a:srgbClr val="FF0000"/>
+              </a:solidFill>
             </a:ln>
           </p:spPr>
           <p:style>
@@ -8858,6 +9068,11 @@
             <a:prstGeom prst="rect">
               <a:avLst/>
             </a:prstGeom>
+            <a:ln>
+              <a:solidFill>
+                <a:srgbClr val="00FF00"/>
+              </a:solidFill>
+            </a:ln>
           </p:spPr>
           <p:style>
             <a:lnRef idx="2">
@@ -8900,6 +9115,11 @@
                 <a:gd name="adj" fmla="val 20621"/>
               </a:avLst>
             </a:prstGeom>
+            <a:ln>
+              <a:solidFill>
+                <a:srgbClr val="00FF00"/>
+              </a:solidFill>
+            </a:ln>
           </p:spPr>
           <p:style>
             <a:lnRef idx="2">
@@ -8944,7 +9164,9 @@
               <a:schemeClr val="bg1"/>
             </a:solidFill>
             <a:ln>
-              <a:noFill/>
+              <a:solidFill>
+                <a:srgbClr val="00FF00"/>
+              </a:solidFill>
             </a:ln>
           </p:spPr>
           <p:style>
@@ -8990,7 +9212,9 @@
               <a:schemeClr val="tx1"/>
             </a:solidFill>
             <a:ln>
-              <a:noFill/>
+              <a:solidFill>
+                <a:srgbClr val="00FF00"/>
+              </a:solidFill>
             </a:ln>
           </p:spPr>
           <p:style>
@@ -9034,7 +9258,9 @@
               <a:schemeClr val="tx1"/>
             </a:solidFill>
             <a:ln>
-              <a:noFill/>
+              <a:solidFill>
+                <a:srgbClr val="00FF00"/>
+              </a:solidFill>
             </a:ln>
           </p:spPr>
           <p:style>
@@ -9078,7 +9304,9 @@
               <a:schemeClr val="tx1"/>
             </a:solidFill>
             <a:ln>
-              <a:noFill/>
+              <a:solidFill>
+                <a:srgbClr val="00FF00"/>
+              </a:solidFill>
             </a:ln>
           </p:spPr>
           <p:style>
@@ -9122,7 +9350,9 @@
               <a:schemeClr val="tx1"/>
             </a:solidFill>
             <a:ln>
-              <a:noFill/>
+              <a:solidFill>
+                <a:srgbClr val="00FF00"/>
+              </a:solidFill>
             </a:ln>
           </p:spPr>
           <p:style>
@@ -9166,7 +9396,9 @@
               <a:schemeClr val="tx1"/>
             </a:solidFill>
             <a:ln>
-              <a:noFill/>
+              <a:solidFill>
+                <a:srgbClr val="00FF00"/>
+              </a:solidFill>
             </a:ln>
           </p:spPr>
           <p:style>
@@ -9682,7 +9914,7 @@
           <p:nvPr/>
         </p:nvPicPr>
         <p:blipFill>
-          <a:blip r:embed="rId6" cstate="print">
+          <a:blip r:embed="rId12" cstate="print">
             <a:extLst>
               <a:ext uri="{BEBA8EAE-BF5A-486C-A8C5-ECC9F3942E4B}">
                 <a14:imgProps xmlns:a14="http://schemas.microsoft.com/office/drawing/2010/main">
@@ -9846,7 +10078,7 @@
             <a:extLst>
               <a:ext uri="{BEBA8EAE-BF5A-486C-A8C5-ECC9F3942E4B}">
                 <a14:imgProps xmlns:a14="http://schemas.microsoft.com/office/drawing/2010/main">
-                  <a14:imgLayer r:embed="rId12">
+                  <a14:imgLayer r:embed="rId13">
                     <a14:imgEffect>
                       <a14:backgroundRemoval t="0" b="99123" l="0" r="100000">
                         <a14:foregroundMark x1="20000" y1="69591" x2="25185" y2="78947"/>
@@ -9941,6 +10173,11 @@
             <a:prstGeom prst="rect">
               <a:avLst/>
             </a:prstGeom>
+            <a:ln>
+              <a:solidFill>
+                <a:srgbClr val="00FF00"/>
+              </a:solidFill>
+            </a:ln>
           </p:spPr>
           <p:style>
             <a:lnRef idx="2">
@@ -9983,6 +10220,11 @@
                 <a:gd name="adj" fmla="val 20621"/>
               </a:avLst>
             </a:prstGeom>
+            <a:ln>
+              <a:solidFill>
+                <a:srgbClr val="00FF00"/>
+              </a:solidFill>
+            </a:ln>
           </p:spPr>
           <p:style>
             <a:lnRef idx="2">
@@ -10027,7 +10269,9 @@
               <a:schemeClr val="bg1"/>
             </a:solidFill>
             <a:ln>
-              <a:noFill/>
+              <a:solidFill>
+                <a:srgbClr val="00FF00"/>
+              </a:solidFill>
             </a:ln>
           </p:spPr>
           <p:style>
@@ -10073,7 +10317,9 @@
               <a:schemeClr val="tx1"/>
             </a:solidFill>
             <a:ln>
-              <a:noFill/>
+              <a:solidFill>
+                <a:srgbClr val="00FF00"/>
+              </a:solidFill>
             </a:ln>
           </p:spPr>
           <p:style>
@@ -10117,7 +10363,9 @@
               <a:schemeClr val="tx1"/>
             </a:solidFill>
             <a:ln>
-              <a:noFill/>
+              <a:solidFill>
+                <a:srgbClr val="00FF00"/>
+              </a:solidFill>
             </a:ln>
           </p:spPr>
           <p:style>
@@ -10161,7 +10409,9 @@
               <a:schemeClr val="tx1"/>
             </a:solidFill>
             <a:ln>
-              <a:noFill/>
+              <a:solidFill>
+                <a:srgbClr val="00FF00"/>
+              </a:solidFill>
             </a:ln>
           </p:spPr>
           <p:style>
@@ -10205,7 +10455,9 @@
               <a:schemeClr val="tx1"/>
             </a:solidFill>
             <a:ln>
-              <a:noFill/>
+              <a:solidFill>
+                <a:srgbClr val="00FF00"/>
+              </a:solidFill>
             </a:ln>
           </p:spPr>
           <p:style>
@@ -10249,7 +10501,9 @@
               <a:schemeClr val="tx1"/>
             </a:solidFill>
             <a:ln>
-              <a:noFill/>
+              <a:solidFill>
+                <a:srgbClr val="00FF00"/>
+              </a:solidFill>
             </a:ln>
           </p:spPr>
           <p:style>
@@ -10304,6 +10558,11 @@
             <a:prstGeom prst="rect">
               <a:avLst/>
             </a:prstGeom>
+            <a:ln>
+              <a:solidFill>
+                <a:srgbClr val="00FF00"/>
+              </a:solidFill>
+            </a:ln>
           </p:spPr>
           <p:style>
             <a:lnRef idx="2">
@@ -10346,6 +10605,11 @@
                 <a:gd name="adj" fmla="val 20621"/>
               </a:avLst>
             </a:prstGeom>
+            <a:ln>
+              <a:solidFill>
+                <a:srgbClr val="00FF00"/>
+              </a:solidFill>
+            </a:ln>
           </p:spPr>
           <p:style>
             <a:lnRef idx="2">
@@ -10390,7 +10654,9 @@
               <a:schemeClr val="bg1"/>
             </a:solidFill>
             <a:ln>
-              <a:noFill/>
+              <a:solidFill>
+                <a:srgbClr val="00FF00"/>
+              </a:solidFill>
             </a:ln>
           </p:spPr>
           <p:style>
@@ -10436,7 +10702,9 @@
               <a:schemeClr val="tx1"/>
             </a:solidFill>
             <a:ln>
-              <a:noFill/>
+              <a:solidFill>
+                <a:srgbClr val="00FF00"/>
+              </a:solidFill>
             </a:ln>
           </p:spPr>
           <p:style>
@@ -10480,7 +10748,9 @@
               <a:schemeClr val="tx1"/>
             </a:solidFill>
             <a:ln>
-              <a:noFill/>
+              <a:solidFill>
+                <a:srgbClr val="00FF00"/>
+              </a:solidFill>
             </a:ln>
           </p:spPr>
           <p:style>
@@ -10524,7 +10794,9 @@
               <a:schemeClr val="tx1"/>
             </a:solidFill>
             <a:ln>
-              <a:noFill/>
+              <a:solidFill>
+                <a:srgbClr val="00FF00"/>
+              </a:solidFill>
             </a:ln>
           </p:spPr>
           <p:style>
@@ -10568,7 +10840,9 @@
               <a:schemeClr val="tx1"/>
             </a:solidFill>
             <a:ln>
-              <a:noFill/>
+              <a:solidFill>
+                <a:srgbClr val="00FF00"/>
+              </a:solidFill>
             </a:ln>
           </p:spPr>
           <p:style>
@@ -10612,7 +10886,9 @@
               <a:schemeClr val="tx1"/>
             </a:solidFill>
             <a:ln>
-              <a:noFill/>
+              <a:solidFill>
+                <a:srgbClr val="00FF00"/>
+              </a:solidFill>
             </a:ln>
           </p:spPr>
           <p:style>
@@ -10667,6 +10943,11 @@
             <a:prstGeom prst="rect">
               <a:avLst/>
             </a:prstGeom>
+            <a:ln>
+              <a:solidFill>
+                <a:srgbClr val="FFC000"/>
+              </a:solidFill>
+            </a:ln>
           </p:spPr>
           <p:style>
             <a:lnRef idx="2">
@@ -10709,6 +10990,11 @@
                 <a:gd name="adj" fmla="val 20621"/>
               </a:avLst>
             </a:prstGeom>
+            <a:ln>
+              <a:solidFill>
+                <a:srgbClr val="FFC000"/>
+              </a:solidFill>
+            </a:ln>
           </p:spPr>
           <p:style>
             <a:lnRef idx="2">
@@ -10753,7 +11039,9 @@
               <a:schemeClr val="bg1"/>
             </a:solidFill>
             <a:ln>
-              <a:noFill/>
+              <a:solidFill>
+                <a:srgbClr val="FFC000"/>
+              </a:solidFill>
             </a:ln>
           </p:spPr>
           <p:style>
@@ -10799,7 +11087,9 @@
               <a:schemeClr val="tx1"/>
             </a:solidFill>
             <a:ln>
-              <a:noFill/>
+              <a:solidFill>
+                <a:srgbClr val="FFC000"/>
+              </a:solidFill>
             </a:ln>
           </p:spPr>
           <p:style>
@@ -10843,7 +11133,9 @@
               <a:schemeClr val="tx1"/>
             </a:solidFill>
             <a:ln>
-              <a:noFill/>
+              <a:solidFill>
+                <a:srgbClr val="FFC000"/>
+              </a:solidFill>
             </a:ln>
           </p:spPr>
           <p:style>
@@ -10887,7 +11179,9 @@
               <a:schemeClr val="tx1"/>
             </a:solidFill>
             <a:ln>
-              <a:noFill/>
+              <a:solidFill>
+                <a:srgbClr val="FFC000"/>
+              </a:solidFill>
             </a:ln>
           </p:spPr>
           <p:style>
@@ -10942,6 +11236,11 @@
             <a:prstGeom prst="rect">
               <a:avLst/>
             </a:prstGeom>
+            <a:ln>
+              <a:solidFill>
+                <a:srgbClr val="FFC000"/>
+              </a:solidFill>
+            </a:ln>
           </p:spPr>
           <p:style>
             <a:lnRef idx="2">
@@ -10984,6 +11283,11 @@
                 <a:gd name="adj" fmla="val 20621"/>
               </a:avLst>
             </a:prstGeom>
+            <a:ln>
+              <a:solidFill>
+                <a:srgbClr val="FFC000"/>
+              </a:solidFill>
+            </a:ln>
           </p:spPr>
           <p:style>
             <a:lnRef idx="2">
@@ -11028,7 +11332,9 @@
               <a:schemeClr val="bg1"/>
             </a:solidFill>
             <a:ln>
-              <a:noFill/>
+              <a:solidFill>
+                <a:srgbClr val="FFC000"/>
+              </a:solidFill>
             </a:ln>
           </p:spPr>
           <p:style>
@@ -11074,7 +11380,9 @@
               <a:schemeClr val="tx1"/>
             </a:solidFill>
             <a:ln>
-              <a:noFill/>
+              <a:solidFill>
+                <a:srgbClr val="FFC000"/>
+              </a:solidFill>
             </a:ln>
           </p:spPr>
           <p:style>
@@ -11118,7 +11426,9 @@
               <a:schemeClr val="tx1"/>
             </a:solidFill>
             <a:ln>
-              <a:noFill/>
+              <a:solidFill>
+                <a:srgbClr val="FFC000"/>
+              </a:solidFill>
             </a:ln>
           </p:spPr>
           <p:style>
@@ -11162,7 +11472,9 @@
               <a:schemeClr val="tx1"/>
             </a:solidFill>
             <a:ln>
-              <a:noFill/>
+              <a:solidFill>
+                <a:srgbClr val="FFC000"/>
+              </a:solidFill>
             </a:ln>
           </p:spPr>
           <p:style>
@@ -11217,6 +11529,11 @@
             <a:prstGeom prst="rect">
               <a:avLst/>
             </a:prstGeom>
+            <a:ln>
+              <a:solidFill>
+                <a:srgbClr val="FFC000"/>
+              </a:solidFill>
+            </a:ln>
           </p:spPr>
           <p:style>
             <a:lnRef idx="2">
@@ -11259,6 +11576,11 @@
                 <a:gd name="adj" fmla="val 20621"/>
               </a:avLst>
             </a:prstGeom>
+            <a:ln>
+              <a:solidFill>
+                <a:srgbClr val="FFC000"/>
+              </a:solidFill>
+            </a:ln>
           </p:spPr>
           <p:style>
             <a:lnRef idx="2">
@@ -11303,7 +11625,9 @@
               <a:schemeClr val="bg1"/>
             </a:solidFill>
             <a:ln>
-              <a:noFill/>
+              <a:solidFill>
+                <a:srgbClr val="FFC000"/>
+              </a:solidFill>
             </a:ln>
           </p:spPr>
           <p:style>
@@ -11349,7 +11673,9 @@
               <a:schemeClr val="tx1"/>
             </a:solidFill>
             <a:ln>
-              <a:noFill/>
+              <a:solidFill>
+                <a:srgbClr val="FFC000"/>
+              </a:solidFill>
             </a:ln>
           </p:spPr>
           <p:style>
@@ -11393,7 +11719,9 @@
               <a:schemeClr val="tx1"/>
             </a:solidFill>
             <a:ln>
-              <a:noFill/>
+              <a:solidFill>
+                <a:srgbClr val="FFC000"/>
+              </a:solidFill>
             </a:ln>
           </p:spPr>
           <p:style>
@@ -11437,7 +11765,9 @@
               <a:schemeClr val="tx1"/>
             </a:solidFill>
             <a:ln>
-              <a:noFill/>
+              <a:solidFill>
+                <a:srgbClr val="FFC000"/>
+              </a:solidFill>
             </a:ln>
           </p:spPr>
           <p:style>
@@ -11492,6 +11822,11 @@
             <a:prstGeom prst="rect">
               <a:avLst/>
             </a:prstGeom>
+            <a:ln>
+              <a:solidFill>
+                <a:srgbClr val="FFC000"/>
+              </a:solidFill>
+            </a:ln>
           </p:spPr>
           <p:style>
             <a:lnRef idx="2">
@@ -11534,6 +11869,11 @@
                 <a:gd name="adj" fmla="val 20621"/>
               </a:avLst>
             </a:prstGeom>
+            <a:ln>
+              <a:solidFill>
+                <a:srgbClr val="FFC000"/>
+              </a:solidFill>
+            </a:ln>
           </p:spPr>
           <p:style>
             <a:lnRef idx="2">
@@ -11578,7 +11918,9 @@
               <a:schemeClr val="bg1"/>
             </a:solidFill>
             <a:ln>
-              <a:noFill/>
+              <a:solidFill>
+                <a:srgbClr val="FFC000"/>
+              </a:solidFill>
             </a:ln>
           </p:spPr>
           <p:style>
@@ -11624,7 +11966,9 @@
               <a:schemeClr val="tx1"/>
             </a:solidFill>
             <a:ln>
-              <a:noFill/>
+              <a:solidFill>
+                <a:srgbClr val="FFC000"/>
+              </a:solidFill>
             </a:ln>
           </p:spPr>
           <p:style>
@@ -11668,7 +12012,9 @@
               <a:schemeClr val="tx1"/>
             </a:solidFill>
             <a:ln>
-              <a:noFill/>
+              <a:solidFill>
+                <a:srgbClr val="FFC000"/>
+              </a:solidFill>
             </a:ln>
           </p:spPr>
           <p:style>
@@ -11712,7 +12058,9 @@
               <a:schemeClr val="tx1"/>
             </a:solidFill>
             <a:ln>
-              <a:noFill/>
+              <a:solidFill>
+                <a:srgbClr val="FFC000"/>
+              </a:solidFill>
             </a:ln>
           </p:spPr>
           <p:style>
@@ -11767,6 +12115,11 @@
             <a:prstGeom prst="rect">
               <a:avLst/>
             </a:prstGeom>
+            <a:ln>
+              <a:solidFill>
+                <a:srgbClr val="FFC000"/>
+              </a:solidFill>
+            </a:ln>
           </p:spPr>
           <p:style>
             <a:lnRef idx="2">
@@ -11809,6 +12162,11 @@
                 <a:gd name="adj" fmla="val 20621"/>
               </a:avLst>
             </a:prstGeom>
+            <a:ln>
+              <a:solidFill>
+                <a:srgbClr val="FFC000"/>
+              </a:solidFill>
+            </a:ln>
           </p:spPr>
           <p:style>
             <a:lnRef idx="2">
@@ -11853,7 +12211,9 @@
               <a:schemeClr val="bg1"/>
             </a:solidFill>
             <a:ln>
-              <a:noFill/>
+              <a:solidFill>
+                <a:srgbClr val="FFC000"/>
+              </a:solidFill>
             </a:ln>
           </p:spPr>
           <p:style>
@@ -11899,7 +12259,9 @@
               <a:schemeClr val="tx1"/>
             </a:solidFill>
             <a:ln>
-              <a:noFill/>
+              <a:solidFill>
+                <a:srgbClr val="FFC000"/>
+              </a:solidFill>
             </a:ln>
           </p:spPr>
           <p:style>
@@ -11943,7 +12305,9 @@
               <a:schemeClr val="tx1"/>
             </a:solidFill>
             <a:ln>
-              <a:noFill/>
+              <a:solidFill>
+                <a:srgbClr val="FFC000"/>
+              </a:solidFill>
             </a:ln>
           </p:spPr>
           <p:style>
@@ -11987,7 +12351,9 @@
               <a:schemeClr val="tx1"/>
             </a:solidFill>
             <a:ln>
-              <a:noFill/>
+              <a:solidFill>
+                <a:srgbClr val="FFC000"/>
+              </a:solidFill>
             </a:ln>
           </p:spPr>
           <p:style>
@@ -12042,6 +12408,11 @@
             <a:prstGeom prst="rect">
               <a:avLst/>
             </a:prstGeom>
+            <a:ln>
+              <a:solidFill>
+                <a:srgbClr val="FFC000"/>
+              </a:solidFill>
+            </a:ln>
           </p:spPr>
           <p:style>
             <a:lnRef idx="2">
@@ -12084,6 +12455,11 @@
                 <a:gd name="adj" fmla="val 20621"/>
               </a:avLst>
             </a:prstGeom>
+            <a:ln>
+              <a:solidFill>
+                <a:srgbClr val="FFC000"/>
+              </a:solidFill>
+            </a:ln>
           </p:spPr>
           <p:style>
             <a:lnRef idx="2">
@@ -12128,7 +12504,9 @@
               <a:schemeClr val="bg1"/>
             </a:solidFill>
             <a:ln>
-              <a:noFill/>
+              <a:solidFill>
+                <a:srgbClr val="FFC000"/>
+              </a:solidFill>
             </a:ln>
           </p:spPr>
           <p:style>
@@ -12174,7 +12552,9 @@
               <a:schemeClr val="tx1"/>
             </a:solidFill>
             <a:ln>
-              <a:noFill/>
+              <a:solidFill>
+                <a:srgbClr val="FFC000"/>
+              </a:solidFill>
             </a:ln>
           </p:spPr>
           <p:style>
@@ -12218,7 +12598,9 @@
               <a:schemeClr val="tx1"/>
             </a:solidFill>
             <a:ln>
-              <a:noFill/>
+              <a:solidFill>
+                <a:srgbClr val="FFC000"/>
+              </a:solidFill>
             </a:ln>
           </p:spPr>
           <p:style>
@@ -12262,7 +12644,9 @@
               <a:schemeClr val="tx1"/>
             </a:solidFill>
             <a:ln>
-              <a:noFill/>
+              <a:solidFill>
+                <a:srgbClr val="FFC000"/>
+              </a:solidFill>
             </a:ln>
           </p:spPr>
           <p:style>
@@ -12317,6 +12701,11 @@
             <a:prstGeom prst="rect">
               <a:avLst/>
             </a:prstGeom>
+            <a:ln>
+              <a:solidFill>
+                <a:srgbClr val="FFC000"/>
+              </a:solidFill>
+            </a:ln>
           </p:spPr>
           <p:style>
             <a:lnRef idx="2">
@@ -12359,6 +12748,11 @@
                 <a:gd name="adj" fmla="val 20621"/>
               </a:avLst>
             </a:prstGeom>
+            <a:ln>
+              <a:solidFill>
+                <a:srgbClr val="FFC000"/>
+              </a:solidFill>
+            </a:ln>
           </p:spPr>
           <p:style>
             <a:lnRef idx="2">
@@ -12403,7 +12797,9 @@
               <a:schemeClr val="bg1"/>
             </a:solidFill>
             <a:ln>
-              <a:noFill/>
+              <a:solidFill>
+                <a:srgbClr val="FFC000"/>
+              </a:solidFill>
             </a:ln>
           </p:spPr>
           <p:style>
@@ -12449,7 +12845,9 @@
               <a:schemeClr val="tx1"/>
             </a:solidFill>
             <a:ln>
-              <a:noFill/>
+              <a:solidFill>
+                <a:srgbClr val="FFC000"/>
+              </a:solidFill>
             </a:ln>
           </p:spPr>
           <p:style>
@@ -12493,7 +12891,9 @@
               <a:schemeClr val="tx1"/>
             </a:solidFill>
             <a:ln>
-              <a:noFill/>
+              <a:solidFill>
+                <a:srgbClr val="FFC000"/>
+              </a:solidFill>
             </a:ln>
           </p:spPr>
           <p:style>
@@ -12537,7 +12937,9 @@
               <a:schemeClr val="tx1"/>
             </a:solidFill>
             <a:ln>
-              <a:noFill/>
+              <a:solidFill>
+                <a:srgbClr val="FFC000"/>
+              </a:solidFill>
             </a:ln>
           </p:spPr>
           <p:style>

</xml_diff>